<commit_message>
Added info for GitHub, etc. to decks
</commit_message>
<xml_diff>
--- a/decks/Kendo CRUD - Likness.pptx
+++ b/decks/Kendo CRUD - Likness.pptx
@@ -5,10 +5,10 @@
     <p:sldMasterId id="2147483660" r:id="rId2"/>
   </p:sldMasterIdLst>
   <p:notesMasterIdLst>
-    <p:notesMasterId r:id="rId23"/>
+    <p:notesMasterId r:id="rId24"/>
   </p:notesMasterIdLst>
   <p:handoutMasterIdLst>
-    <p:handoutMasterId r:id="rId24"/>
+    <p:handoutMasterId r:id="rId25"/>
   </p:handoutMasterIdLst>
   <p:sldIdLst>
     <p:sldId id="257" r:id="rId3"/>
@@ -16,21 +16,22 @@
     <p:sldId id="272" r:id="rId5"/>
     <p:sldId id="273" r:id="rId6"/>
     <p:sldId id="275" r:id="rId7"/>
-    <p:sldId id="274" r:id="rId8"/>
-    <p:sldId id="276" r:id="rId9"/>
-    <p:sldId id="286" r:id="rId10"/>
-    <p:sldId id="277" r:id="rId11"/>
-    <p:sldId id="278" r:id="rId12"/>
-    <p:sldId id="279" r:id="rId13"/>
-    <p:sldId id="280" r:id="rId14"/>
-    <p:sldId id="281" r:id="rId15"/>
-    <p:sldId id="282" r:id="rId16"/>
-    <p:sldId id="283" r:id="rId17"/>
-    <p:sldId id="284" r:id="rId18"/>
-    <p:sldId id="285" r:id="rId19"/>
-    <p:sldId id="287" r:id="rId20"/>
-    <p:sldId id="288" r:id="rId21"/>
-    <p:sldId id="265" r:id="rId22"/>
+    <p:sldId id="289" r:id="rId8"/>
+    <p:sldId id="274" r:id="rId9"/>
+    <p:sldId id="276" r:id="rId10"/>
+    <p:sldId id="286" r:id="rId11"/>
+    <p:sldId id="277" r:id="rId12"/>
+    <p:sldId id="278" r:id="rId13"/>
+    <p:sldId id="279" r:id="rId14"/>
+    <p:sldId id="280" r:id="rId15"/>
+    <p:sldId id="281" r:id="rId16"/>
+    <p:sldId id="282" r:id="rId17"/>
+    <p:sldId id="283" r:id="rId18"/>
+    <p:sldId id="284" r:id="rId19"/>
+    <p:sldId id="285" r:id="rId20"/>
+    <p:sldId id="287" r:id="rId21"/>
+    <p:sldId id="288" r:id="rId22"/>
+    <p:sldId id="265" r:id="rId23"/>
   </p:sldIdLst>
   <p:sldSz cx="12188825" cy="6858000"/>
   <p:notesSz cx="6858000" cy="9144000"/>
@@ -3564,7 +3565,7 @@
           <a:p>
             <a:fld id="{FE5B4EDC-59C0-49C7-8ADA-5A781B329E02}" type="datetimeFigureOut">
               <a:rPr lang="en-US"/>
-              <a:t>4/25/2015</a:t>
+              <a:t>5/2/2015</a:t>
             </a:fld>
             <a:endParaRPr/>
           </a:p>
@@ -3729,7 +3730,7 @@
           <a:p>
             <a:fld id="{F2D8D46A-B586-417D-BFBD-8C8FE0AAF762}" type="datetimeFigureOut">
               <a:rPr lang="en-US"/>
-              <a:t>4/25/2015</a:t>
+              <a:t>5/2/2015</a:t>
             </a:fld>
             <a:endParaRPr/>
           </a:p>
@@ -4752,7 +4753,7 @@
           <a:p>
             <a:fld id="{F0DFD029-FB74-4578-B929-F66AA97659CA}" type="datetimeFigureOut">
               <a:rPr lang="en-US"/>
-              <a:t>4/25/2015</a:t>
+              <a:t>5/2/2015</a:t>
             </a:fld>
             <a:endParaRPr/>
           </a:p>
@@ -4957,7 +4958,7 @@
           <a:p>
             <a:fld id="{F0DFD029-FB74-4578-B929-F66AA97659CA}" type="datetimeFigureOut">
               <a:rPr lang="en-US"/>
-              <a:t>4/25/2015</a:t>
+              <a:t>5/2/2015</a:t>
             </a:fld>
             <a:endParaRPr/>
           </a:p>
@@ -5172,7 +5173,7 @@
           <a:p>
             <a:fld id="{F0DFD029-FB74-4578-B929-F66AA97659CA}" type="datetimeFigureOut">
               <a:rPr lang="en-US"/>
-              <a:t>4/25/2015</a:t>
+              <a:t>5/2/2015</a:t>
             </a:fld>
             <a:endParaRPr/>
           </a:p>
@@ -5377,7 +5378,7 @@
           <a:p>
             <a:fld id="{F0DFD029-FB74-4578-B929-F66AA97659CA}" type="datetimeFigureOut">
               <a:rPr lang="en-US"/>
-              <a:t>4/25/2015</a:t>
+              <a:t>5/2/2015</a:t>
             </a:fld>
             <a:endParaRPr/>
           </a:p>
@@ -5647,7 +5648,7 @@
           <a:p>
             <a:fld id="{F0DFD029-FB74-4578-B929-F66AA97659CA}" type="datetimeFigureOut">
               <a:rPr lang="en-US"/>
-              <a:t>4/25/2015</a:t>
+              <a:t>5/2/2015</a:t>
             </a:fld>
             <a:endParaRPr/>
           </a:p>
@@ -6127,7 +6128,7 @@
           <a:p>
             <a:fld id="{F0DFD029-FB74-4578-B929-F66AA97659CA}" type="datetimeFigureOut">
               <a:rPr lang="en-US"/>
-              <a:t>4/25/2015</a:t>
+              <a:t>5/2/2015</a:t>
             </a:fld>
             <a:endParaRPr/>
           </a:p>
@@ -6590,7 +6591,7 @@
           <a:p>
             <a:fld id="{F0DFD029-FB74-4578-B929-F66AA97659CA}" type="datetimeFigureOut">
               <a:rPr lang="en-US"/>
-              <a:t>4/25/2015</a:t>
+              <a:t>5/2/2015</a:t>
             </a:fld>
             <a:endParaRPr/>
           </a:p>
@@ -6727,7 +6728,7 @@
           <a:p>
             <a:fld id="{F0DFD029-FB74-4578-B929-F66AA97659CA}" type="datetimeFigureOut">
               <a:rPr lang="en-US"/>
-              <a:t>4/25/2015</a:t>
+              <a:t>5/2/2015</a:t>
             </a:fld>
             <a:endParaRPr/>
           </a:p>
@@ -6841,7 +6842,7 @@
           <a:p>
             <a:fld id="{F0DFD029-FB74-4578-B929-F66AA97659CA}" type="datetimeFigureOut">
               <a:rPr lang="en-US"/>
-              <a:t>4/25/2015</a:t>
+              <a:t>5/2/2015</a:t>
             </a:fld>
             <a:endParaRPr/>
           </a:p>
@@ -7147,7 +7148,7 @@
           <a:p>
             <a:fld id="{F0DFD029-FB74-4578-B929-F66AA97659CA}" type="datetimeFigureOut">
               <a:rPr lang="en-US"/>
-              <a:t>4/25/2015</a:t>
+              <a:t>5/2/2015</a:t>
             </a:fld>
             <a:endParaRPr/>
           </a:p>
@@ -7442,7 +7443,7 @@
           <a:p>
             <a:fld id="{F0DFD029-FB74-4578-B929-F66AA97659CA}" type="datetimeFigureOut">
               <a:rPr lang="en-US"/>
-              <a:t>4/25/2015</a:t>
+              <a:t>5/2/2015</a:t>
             </a:fld>
             <a:endParaRPr/>
           </a:p>
@@ -8072,7 +8073,7 @@
             <a:fld id="{F0DFD029-FB74-4578-B929-F66AA97659CA}" type="datetimeFigureOut">
               <a:rPr lang="en-US"/>
               <a:pPr/>
-              <a:t>4/25/2015</a:t>
+              <a:t>5/2/2015</a:t>
             </a:fld>
             <a:endParaRPr/>
           </a:p>
@@ -8763,6 +8764,367 @@
       </p:grpSpPr>
       <p:sp>
         <p:nvSpPr>
+          <p:cNvPr id="2" name="Title 1"/>
+          <p:cNvSpPr>
+            <a:spLocks noGrp="1"/>
+          </p:cNvSpPr>
+          <p:nvPr>
+            <p:ph type="title"/>
+          </p:nvPr>
+        </p:nvSpPr>
+        <p:spPr/>
+        <p:txBody>
+          <a:bodyPr/>
+          <a:lstStyle/>
+          <a:p>
+            <a:r>
+              <a:rPr lang="en-US" dirty="0" smtClean="0"/>
+              <a:t>Web API and REST</a:t>
+            </a:r>
+            <a:endParaRPr lang="en-US" dirty="0"/>
+          </a:p>
+        </p:txBody>
+      </p:sp>
+      <p:sp>
+        <p:nvSpPr>
+          <p:cNvPr id="3" name="Content Placeholder 2"/>
+          <p:cNvSpPr>
+            <a:spLocks noGrp="1"/>
+          </p:cNvSpPr>
+          <p:nvPr>
+            <p:ph sz="half" idx="1"/>
+          </p:nvPr>
+        </p:nvSpPr>
+        <p:spPr/>
+        <p:txBody>
+          <a:bodyPr/>
+          <a:lstStyle/>
+          <a:p>
+            <a:r>
+              <a:rPr lang="en-US" dirty="0" smtClean="0"/>
+              <a:t>Entity Framework gives you easy access to your data</a:t>
+            </a:r>
+          </a:p>
+          <a:p>
+            <a:r>
+              <a:rPr lang="en-US" dirty="0" smtClean="0"/>
+              <a:t>Repository pattern is nice (we’ll skip it today)</a:t>
+            </a:r>
+          </a:p>
+          <a:p>
+            <a:r>
+              <a:rPr lang="en-US" dirty="0" smtClean="0"/>
+              <a:t>Web API is all about taking your data and exposing it via REST</a:t>
+            </a:r>
+          </a:p>
+          <a:p>
+            <a:r>
+              <a:rPr lang="en-US" dirty="0" smtClean="0"/>
+              <a:t>OData is another option on top of Web API</a:t>
+            </a:r>
+            <a:endParaRPr lang="en-US" dirty="0"/>
+          </a:p>
+        </p:txBody>
+      </p:sp>
+      <p:pic>
+        <p:nvPicPr>
+          <p:cNvPr id="5" name="Content Placeholder 4"/>
+          <p:cNvPicPr>
+            <a:picLocks noGrp="1" noChangeAspect="1"/>
+          </p:cNvPicPr>
+          <p:nvPr>
+            <p:ph sz="half" idx="2"/>
+          </p:nvPr>
+        </p:nvPicPr>
+        <p:blipFill>
+          <a:blip r:embed="rId2" cstate="print">
+            <a:extLst>
+              <a:ext uri="{28A0092B-C50C-407E-A947-70E740481C1C}">
+                <a14:useLocalDpi xmlns:a14="http://schemas.microsoft.com/office/drawing/2010/main" val="0"/>
+              </a:ext>
+            </a:extLst>
+          </a:blip>
+          <a:stretch>
+            <a:fillRect/>
+          </a:stretch>
+        </p:blipFill>
+        <p:spPr>
+          <a:xfrm>
+            <a:off x="6500813" y="2246577"/>
+            <a:ext cx="5078412" cy="3385608"/>
+          </a:xfrm>
+        </p:spPr>
+      </p:pic>
+    </p:spTree>
+    <p:extLst>
+      <p:ext uri="{BB962C8B-B14F-4D97-AF65-F5344CB8AC3E}">
+        <p14:creationId xmlns:p14="http://schemas.microsoft.com/office/powerpoint/2010/main" val="1081518152"/>
+      </p:ext>
+    </p:extLst>
+  </p:cSld>
+  <p:clrMapOvr>
+    <a:masterClrMapping/>
+  </p:clrMapOvr>
+  <mc:AlternateContent xmlns:mc="http://schemas.openxmlformats.org/markup-compatibility/2006" xmlns:p14="http://schemas.microsoft.com/office/powerpoint/2010/main">
+    <mc:Choice Requires="p14">
+      <p:transition spd="med" p14:dur="700">
+        <p:fade/>
+      </p:transition>
+    </mc:Choice>
+    <mc:Fallback xmlns="">
+      <p:transition spd="med">
+        <p:fade/>
+      </p:transition>
+    </mc:Fallback>
+  </mc:AlternateContent>
+  <p:timing>
+    <p:tnLst>
+      <p:par>
+        <p:cTn id="1" dur="indefinite" restart="never" nodeType="tmRoot">
+          <p:childTnLst>
+            <p:seq concurrent="1" nextAc="seek">
+              <p:cTn id="2" dur="indefinite" nodeType="mainSeq">
+                <p:childTnLst>
+                  <p:par>
+                    <p:cTn id="3" fill="hold">
+                      <p:stCondLst>
+                        <p:cond delay="indefinite"/>
+                      </p:stCondLst>
+                      <p:childTnLst>
+                        <p:par>
+                          <p:cTn id="4" fill="hold">
+                            <p:stCondLst>
+                              <p:cond delay="0"/>
+                            </p:stCondLst>
+                            <p:childTnLst>
+                              <p:par>
+                                <p:cTn id="5" presetID="1" presetClass="entr" presetSubtype="0" fill="hold" nodeType="clickEffect">
+                                  <p:stCondLst>
+                                    <p:cond delay="0"/>
+                                  </p:stCondLst>
+                                  <p:childTnLst>
+                                    <p:set>
+                                      <p:cBhvr>
+                                        <p:cTn id="6" dur="1" fill="hold">
+                                          <p:stCondLst>
+                                            <p:cond delay="0"/>
+                                          </p:stCondLst>
+                                        </p:cTn>
+                                        <p:tgtEl>
+                                          <p:spTgt spid="3">
+                                            <p:txEl>
+                                              <p:pRg st="0" end="0"/>
+                                            </p:txEl>
+                                          </p:spTgt>
+                                        </p:tgtEl>
+                                        <p:attrNameLst>
+                                          <p:attrName>style.visibility</p:attrName>
+                                        </p:attrNameLst>
+                                      </p:cBhvr>
+                                      <p:to>
+                                        <p:strVal val="visible"/>
+                                      </p:to>
+                                    </p:set>
+                                  </p:childTnLst>
+                                </p:cTn>
+                              </p:par>
+                            </p:childTnLst>
+                          </p:cTn>
+                        </p:par>
+                      </p:childTnLst>
+                    </p:cTn>
+                  </p:par>
+                  <p:par>
+                    <p:cTn id="7" fill="hold">
+                      <p:stCondLst>
+                        <p:cond delay="indefinite"/>
+                      </p:stCondLst>
+                      <p:childTnLst>
+                        <p:par>
+                          <p:cTn id="8" fill="hold">
+                            <p:stCondLst>
+                              <p:cond delay="0"/>
+                            </p:stCondLst>
+                            <p:childTnLst>
+                              <p:par>
+                                <p:cTn id="9" presetID="1" presetClass="entr" presetSubtype="0" fill="hold" nodeType="clickEffect">
+                                  <p:stCondLst>
+                                    <p:cond delay="0"/>
+                                  </p:stCondLst>
+                                  <p:childTnLst>
+                                    <p:set>
+                                      <p:cBhvr>
+                                        <p:cTn id="10" dur="1" fill="hold">
+                                          <p:stCondLst>
+                                            <p:cond delay="0"/>
+                                          </p:stCondLst>
+                                        </p:cTn>
+                                        <p:tgtEl>
+                                          <p:spTgt spid="3">
+                                            <p:txEl>
+                                              <p:pRg st="1" end="1"/>
+                                            </p:txEl>
+                                          </p:spTgt>
+                                        </p:tgtEl>
+                                        <p:attrNameLst>
+                                          <p:attrName>style.visibility</p:attrName>
+                                        </p:attrNameLst>
+                                      </p:cBhvr>
+                                      <p:to>
+                                        <p:strVal val="visible"/>
+                                      </p:to>
+                                    </p:set>
+                                  </p:childTnLst>
+                                </p:cTn>
+                              </p:par>
+                            </p:childTnLst>
+                          </p:cTn>
+                        </p:par>
+                      </p:childTnLst>
+                    </p:cTn>
+                  </p:par>
+                  <p:par>
+                    <p:cTn id="11" fill="hold">
+                      <p:stCondLst>
+                        <p:cond delay="indefinite"/>
+                      </p:stCondLst>
+                      <p:childTnLst>
+                        <p:par>
+                          <p:cTn id="12" fill="hold">
+                            <p:stCondLst>
+                              <p:cond delay="0"/>
+                            </p:stCondLst>
+                            <p:childTnLst>
+                              <p:par>
+                                <p:cTn id="13" presetID="1" presetClass="entr" presetSubtype="0" fill="hold" nodeType="clickEffect">
+                                  <p:stCondLst>
+                                    <p:cond delay="0"/>
+                                  </p:stCondLst>
+                                  <p:childTnLst>
+                                    <p:set>
+                                      <p:cBhvr>
+                                        <p:cTn id="14" dur="1" fill="hold">
+                                          <p:stCondLst>
+                                            <p:cond delay="0"/>
+                                          </p:stCondLst>
+                                        </p:cTn>
+                                        <p:tgtEl>
+                                          <p:spTgt spid="3">
+                                            <p:txEl>
+                                              <p:pRg st="2" end="2"/>
+                                            </p:txEl>
+                                          </p:spTgt>
+                                        </p:tgtEl>
+                                        <p:attrNameLst>
+                                          <p:attrName>style.visibility</p:attrName>
+                                        </p:attrNameLst>
+                                      </p:cBhvr>
+                                      <p:to>
+                                        <p:strVal val="visible"/>
+                                      </p:to>
+                                    </p:set>
+                                  </p:childTnLst>
+                                </p:cTn>
+                              </p:par>
+                            </p:childTnLst>
+                          </p:cTn>
+                        </p:par>
+                      </p:childTnLst>
+                    </p:cTn>
+                  </p:par>
+                  <p:par>
+                    <p:cTn id="15" fill="hold">
+                      <p:stCondLst>
+                        <p:cond delay="indefinite"/>
+                      </p:stCondLst>
+                      <p:childTnLst>
+                        <p:par>
+                          <p:cTn id="16" fill="hold">
+                            <p:stCondLst>
+                              <p:cond delay="0"/>
+                            </p:stCondLst>
+                            <p:childTnLst>
+                              <p:par>
+                                <p:cTn id="17" presetID="1" presetClass="entr" presetSubtype="0" fill="hold" nodeType="clickEffect">
+                                  <p:stCondLst>
+                                    <p:cond delay="0"/>
+                                  </p:stCondLst>
+                                  <p:childTnLst>
+                                    <p:set>
+                                      <p:cBhvr>
+                                        <p:cTn id="18" dur="1" fill="hold">
+                                          <p:stCondLst>
+                                            <p:cond delay="0"/>
+                                          </p:stCondLst>
+                                        </p:cTn>
+                                        <p:tgtEl>
+                                          <p:spTgt spid="3">
+                                            <p:txEl>
+                                              <p:pRg st="3" end="3"/>
+                                            </p:txEl>
+                                          </p:spTgt>
+                                        </p:tgtEl>
+                                        <p:attrNameLst>
+                                          <p:attrName>style.visibility</p:attrName>
+                                        </p:attrNameLst>
+                                      </p:cBhvr>
+                                      <p:to>
+                                        <p:strVal val="visible"/>
+                                      </p:to>
+                                    </p:set>
+                                  </p:childTnLst>
+                                </p:cTn>
+                              </p:par>
+                            </p:childTnLst>
+                          </p:cTn>
+                        </p:par>
+                      </p:childTnLst>
+                    </p:cTn>
+                  </p:par>
+                </p:childTnLst>
+              </p:cTn>
+              <p:prevCondLst>
+                <p:cond evt="onPrev" delay="0">
+                  <p:tgtEl>
+                    <p:sldTgt/>
+                  </p:tgtEl>
+                </p:cond>
+              </p:prevCondLst>
+              <p:nextCondLst>
+                <p:cond evt="onNext" delay="0">
+                  <p:tgtEl>
+                    <p:sldTgt/>
+                  </p:tgtEl>
+                </p:cond>
+              </p:nextCondLst>
+            </p:seq>
+          </p:childTnLst>
+        </p:cTn>
+      </p:par>
+    </p:tnLst>
+  </p:timing>
+</p:sld>
+</file>
+
+<file path=ppt/slides/slide11.xml><?xml version="1.0" encoding="utf-8"?>
+<p:sld xmlns:a="http://schemas.openxmlformats.org/drawingml/2006/main" xmlns:r="http://schemas.openxmlformats.org/officeDocument/2006/relationships" xmlns:p="http://schemas.openxmlformats.org/presentationml/2006/main">
+  <p:cSld>
+    <p:spTree>
+      <p:nvGrpSpPr>
+        <p:cNvPr id="1" name=""/>
+        <p:cNvGrpSpPr/>
+        <p:nvPr/>
+      </p:nvGrpSpPr>
+      <p:grpSpPr>
+        <a:xfrm>
+          <a:off x="0" y="0"/>
+          <a:ext cx="0" cy="0"/>
+          <a:chOff x="0" y="0"/>
+          <a:chExt cx="0" cy="0"/>
+        </a:xfrm>
+      </p:grpSpPr>
+      <p:sp>
+        <p:nvSpPr>
           <p:cNvPr id="4" name="Title 3"/>
           <p:cNvSpPr>
             <a:spLocks noGrp="1"/>
@@ -8839,7 +9201,7 @@
 </p:sld>
 </file>
 
-<file path=ppt/slides/slide11.xml><?xml version="1.0" encoding="utf-8"?>
+<file path=ppt/slides/slide12.xml><?xml version="1.0" encoding="utf-8"?>
 <p:sld xmlns:a="http://schemas.openxmlformats.org/drawingml/2006/main" xmlns:r="http://schemas.openxmlformats.org/officeDocument/2006/relationships" xmlns:p="http://schemas.openxmlformats.org/presentationml/2006/main">
   <p:cSld>
     <p:spTree>
@@ -9232,7 +9594,7 @@
 </p:sld>
 </file>
 
-<file path=ppt/slides/slide12.xml><?xml version="1.0" encoding="utf-8"?>
+<file path=ppt/slides/slide13.xml><?xml version="1.0" encoding="utf-8"?>
 <p:sld xmlns:a="http://schemas.openxmlformats.org/drawingml/2006/main" xmlns:r="http://schemas.openxmlformats.org/officeDocument/2006/relationships" xmlns:p="http://schemas.openxmlformats.org/presentationml/2006/main">
   <p:cSld>
     <p:spTree>
@@ -9657,7 +10019,7 @@
 </p:sld>
 </file>
 
-<file path=ppt/slides/slide13.xml><?xml version="1.0" encoding="utf-8"?>
+<file path=ppt/slides/slide14.xml><?xml version="1.0" encoding="utf-8"?>
 <p:sld xmlns:a="http://schemas.openxmlformats.org/drawingml/2006/main" xmlns:r="http://schemas.openxmlformats.org/officeDocument/2006/relationships" xmlns:p="http://schemas.openxmlformats.org/presentationml/2006/main">
   <p:cSld>
     <p:spTree>
@@ -9752,7 +10114,7 @@
 </p:sld>
 </file>
 
-<file path=ppt/slides/slide14.xml><?xml version="1.0" encoding="utf-8"?>
+<file path=ppt/slides/slide15.xml><?xml version="1.0" encoding="utf-8"?>
 <p:sld xmlns:a="http://schemas.openxmlformats.org/drawingml/2006/main" xmlns:r="http://schemas.openxmlformats.org/officeDocument/2006/relationships" xmlns:p="http://schemas.openxmlformats.org/presentationml/2006/main">
   <p:cSld>
     <p:spTree>
@@ -10154,7 +10516,7 @@
 </p:sld>
 </file>
 
-<file path=ppt/slides/slide15.xml><?xml version="1.0" encoding="utf-8"?>
+<file path=ppt/slides/slide16.xml><?xml version="1.0" encoding="utf-8"?>
 <p:sld xmlns:a="http://schemas.openxmlformats.org/drawingml/2006/main" xmlns:r="http://schemas.openxmlformats.org/officeDocument/2006/relationships" xmlns:p="http://schemas.openxmlformats.org/presentationml/2006/main">
   <p:cSld>
     <p:spTree>
@@ -10514,7 +10876,7 @@
 </p:sld>
 </file>
 
-<file path=ppt/slides/slide16.xml><?xml version="1.0" encoding="utf-8"?>
+<file path=ppt/slides/slide17.xml><?xml version="1.0" encoding="utf-8"?>
 <p:sld xmlns:a="http://schemas.openxmlformats.org/drawingml/2006/main" xmlns:r="http://schemas.openxmlformats.org/officeDocument/2006/relationships" xmlns:p="http://schemas.openxmlformats.org/presentationml/2006/main">
   <p:cSld>
     <p:spTree>
@@ -10609,7 +10971,7 @@
 </p:sld>
 </file>
 
-<file path=ppt/slides/slide17.xml><?xml version="1.0" encoding="utf-8"?>
+<file path=ppt/slides/slide18.xml><?xml version="1.0" encoding="utf-8"?>
 <p:sld xmlns:a="http://schemas.openxmlformats.org/drawingml/2006/main" xmlns:r="http://schemas.openxmlformats.org/officeDocument/2006/relationships" xmlns:p="http://schemas.openxmlformats.org/presentationml/2006/main">
   <p:cSld>
     <p:spTree>
@@ -10887,7 +11249,7 @@
 </p:sld>
 </file>
 
-<file path=ppt/slides/slide18.xml><?xml version="1.0" encoding="utf-8"?>
+<file path=ppt/slides/slide19.xml><?xml version="1.0" encoding="utf-8"?>
 <p:sld xmlns:a="http://schemas.openxmlformats.org/drawingml/2006/main" xmlns:r="http://schemas.openxmlformats.org/officeDocument/2006/relationships" xmlns:p="http://schemas.openxmlformats.org/presentationml/2006/main">
   <p:cSld>
     <p:spTree>
@@ -10982,7 +11344,7 @@
 </p:sld>
 </file>
 
-<file path=ppt/slides/slide19.xml><?xml version="1.0" encoding="utf-8"?>
+<file path=ppt/slides/slide2.xml><?xml version="1.0" encoding="utf-8"?>
 <p:sld xmlns:a="http://schemas.openxmlformats.org/drawingml/2006/main" xmlns:r="http://schemas.openxmlformats.org/officeDocument/2006/relationships" xmlns:p="http://schemas.openxmlformats.org/presentationml/2006/main">
   <p:cSld>
     <p:spTree>
@@ -11016,6 +11378,143 @@
           <a:p>
             <a:r>
               <a:rPr lang="en-US" dirty="0" smtClean="0"/>
+              <a:t>CRUD (made easy with Kendo UI)</a:t>
+            </a:r>
+            <a:endParaRPr lang="en-US" dirty="0"/>
+          </a:p>
+        </p:txBody>
+      </p:sp>
+      <p:sp>
+        <p:nvSpPr>
+          <p:cNvPr id="14" name="Content Placeholder 13"/>
+          <p:cNvSpPr>
+            <a:spLocks noGrp="1"/>
+          </p:cNvSpPr>
+          <p:nvPr>
+            <p:ph idx="1"/>
+          </p:nvPr>
+        </p:nvSpPr>
+        <p:spPr/>
+        <p:txBody>
+          <a:bodyPr/>
+          <a:lstStyle/>
+          <a:p>
+            <a:r>
+              <a:rPr lang="en-US" dirty="0" smtClean="0"/>
+              <a:t>Introducing the stack to Create, Read, Update, Delete</a:t>
+            </a:r>
+          </a:p>
+          <a:p>
+            <a:r>
+              <a:rPr lang="en-US" dirty="0" smtClean="0"/>
+              <a:t>Data made easy with Entity Framework (or other ORMs)</a:t>
+            </a:r>
+          </a:p>
+          <a:p>
+            <a:r>
+              <a:rPr lang="en-US" dirty="0" smtClean="0"/>
+              <a:t>MVC and Web API (and OData) </a:t>
+            </a:r>
+          </a:p>
+          <a:p>
+            <a:r>
+              <a:rPr lang="en-US" dirty="0" smtClean="0"/>
+              <a:t>Kendo UI from the Client </a:t>
+            </a:r>
+          </a:p>
+          <a:p>
+            <a:r>
+              <a:rPr lang="en-US" dirty="0" err="1" smtClean="0"/>
+              <a:t>DataSourceRequest</a:t>
+            </a:r>
+            <a:r>
+              <a:rPr lang="en-US" dirty="0" smtClean="0"/>
+              <a:t> Unicorn Dust </a:t>
+            </a:r>
+          </a:p>
+          <a:p>
+            <a:r>
+              <a:rPr lang="en-US" dirty="0" smtClean="0"/>
+              <a:t>Bound Forms</a:t>
+            </a:r>
+          </a:p>
+          <a:p>
+            <a:r>
+              <a:rPr lang="en-US" dirty="0" smtClean="0"/>
+              <a:t>Conclusion, Q&amp;A</a:t>
+            </a:r>
+          </a:p>
+          <a:p>
+            <a:endParaRPr lang="en-US" dirty="0"/>
+          </a:p>
+        </p:txBody>
+      </p:sp>
+    </p:spTree>
+    <p:extLst>
+      <p:ext uri="{BB962C8B-B14F-4D97-AF65-F5344CB8AC3E}">
+        <p14:creationId xmlns:p14="http://schemas.microsoft.com/office/powerpoint/2010/main" val="3529114326"/>
+      </p:ext>
+    </p:extLst>
+  </p:cSld>
+  <p:clrMapOvr>
+    <a:masterClrMapping/>
+  </p:clrMapOvr>
+  <mc:AlternateContent xmlns:mc="http://schemas.openxmlformats.org/markup-compatibility/2006" xmlns:p14="http://schemas.microsoft.com/office/powerpoint/2010/main">
+    <mc:Choice Requires="p14">
+      <p:transition spd="med" p14:dur="700">
+        <p:fade/>
+      </p:transition>
+    </mc:Choice>
+    <mc:Fallback xmlns="">
+      <p:transition spd="med">
+        <p:fade/>
+      </p:transition>
+    </mc:Fallback>
+  </mc:AlternateContent>
+  <p:timing>
+    <p:tnLst>
+      <p:par>
+        <p:cTn id="1" dur="indefinite" restart="never" nodeType="tmRoot"/>
+      </p:par>
+    </p:tnLst>
+  </p:timing>
+</p:sld>
+</file>
+
+<file path=ppt/slides/slide20.xml><?xml version="1.0" encoding="utf-8"?>
+<p:sld xmlns:a="http://schemas.openxmlformats.org/drawingml/2006/main" xmlns:r="http://schemas.openxmlformats.org/officeDocument/2006/relationships" xmlns:p="http://schemas.openxmlformats.org/presentationml/2006/main">
+  <p:cSld>
+    <p:spTree>
+      <p:nvGrpSpPr>
+        <p:cNvPr id="1" name=""/>
+        <p:cNvGrpSpPr/>
+        <p:nvPr/>
+      </p:nvGrpSpPr>
+      <p:grpSpPr>
+        <a:xfrm>
+          <a:off x="0" y="0"/>
+          <a:ext cx="0" cy="0"/>
+          <a:chOff x="0" y="0"/>
+          <a:chExt cx="0" cy="0"/>
+        </a:xfrm>
+      </p:grpSpPr>
+      <p:sp>
+        <p:nvSpPr>
+          <p:cNvPr id="13" name="Title 12"/>
+          <p:cNvSpPr>
+            <a:spLocks noGrp="1"/>
+          </p:cNvSpPr>
+          <p:nvPr>
+            <p:ph type="title"/>
+          </p:nvPr>
+        </p:nvSpPr>
+        <p:spPr/>
+        <p:txBody>
+          <a:bodyPr/>
+          <a:lstStyle/>
+          <a:p>
+            <a:r>
+              <a:rPr lang="en-US" dirty="0" smtClean="0"/>
               <a:t>What We Learned</a:t>
             </a:r>
             <a:endParaRPr lang="en-US" dirty="0"/>
@@ -11073,7 +11572,6 @@
               <a:rPr lang="en-US" dirty="0" smtClean="0"/>
               <a:t>“It’s all good.”</a:t>
             </a:r>
-            <a:endParaRPr lang="en-US" dirty="0" smtClean="0"/>
           </a:p>
         </p:txBody>
       </p:sp>
@@ -11426,149 +11924,7 @@
 </p:sld>
 </file>
 
-<file path=ppt/slides/slide2.xml><?xml version="1.0" encoding="utf-8"?>
-<p:sld xmlns:a="http://schemas.openxmlformats.org/drawingml/2006/main" xmlns:r="http://schemas.openxmlformats.org/officeDocument/2006/relationships" xmlns:p="http://schemas.openxmlformats.org/presentationml/2006/main">
-  <p:cSld>
-    <p:spTree>
-      <p:nvGrpSpPr>
-        <p:cNvPr id="1" name=""/>
-        <p:cNvGrpSpPr/>
-        <p:nvPr/>
-      </p:nvGrpSpPr>
-      <p:grpSpPr>
-        <a:xfrm>
-          <a:off x="0" y="0"/>
-          <a:ext cx="0" cy="0"/>
-          <a:chOff x="0" y="0"/>
-          <a:chExt cx="0" cy="0"/>
-        </a:xfrm>
-      </p:grpSpPr>
-      <p:sp>
-        <p:nvSpPr>
-          <p:cNvPr id="13" name="Title 12"/>
-          <p:cNvSpPr>
-            <a:spLocks noGrp="1"/>
-          </p:cNvSpPr>
-          <p:nvPr>
-            <p:ph type="title"/>
-          </p:nvPr>
-        </p:nvSpPr>
-        <p:spPr/>
-        <p:txBody>
-          <a:bodyPr/>
-          <a:lstStyle/>
-          <a:p>
-            <a:r>
-              <a:rPr lang="en-US" dirty="0" smtClean="0"/>
-              <a:t>CRUD (made easy with Kendo UI)</a:t>
-            </a:r>
-            <a:endParaRPr lang="en-US" dirty="0"/>
-          </a:p>
-        </p:txBody>
-      </p:sp>
-      <p:sp>
-        <p:nvSpPr>
-          <p:cNvPr id="14" name="Content Placeholder 13"/>
-          <p:cNvSpPr>
-            <a:spLocks noGrp="1"/>
-          </p:cNvSpPr>
-          <p:nvPr>
-            <p:ph idx="1"/>
-          </p:nvPr>
-        </p:nvSpPr>
-        <p:spPr/>
-        <p:txBody>
-          <a:bodyPr/>
-          <a:lstStyle/>
-          <a:p>
-            <a:r>
-              <a:rPr lang="en-US" dirty="0" smtClean="0"/>
-              <a:t>Introducing the stack to Create, Read, Update, Delete</a:t>
-            </a:r>
-          </a:p>
-          <a:p>
-            <a:r>
-              <a:rPr lang="en-US" dirty="0" smtClean="0"/>
-              <a:t>Data made easy with Entity Framework (or other ORMs)</a:t>
-            </a:r>
-          </a:p>
-          <a:p>
-            <a:r>
-              <a:rPr lang="en-US" dirty="0" smtClean="0"/>
-              <a:t>MVC and Web </a:t>
-            </a:r>
-            <a:r>
-              <a:rPr lang="en-US" dirty="0" smtClean="0"/>
-              <a:t>API (and OData) </a:t>
-            </a:r>
-            <a:endParaRPr lang="en-US" dirty="0" smtClean="0"/>
-          </a:p>
-          <a:p>
-            <a:r>
-              <a:rPr lang="en-US" dirty="0" smtClean="0"/>
-              <a:t>Kendo UI from the Client </a:t>
-            </a:r>
-          </a:p>
-          <a:p>
-            <a:r>
-              <a:rPr lang="en-US" dirty="0" err="1" smtClean="0"/>
-              <a:t>DataSourceRequest</a:t>
-            </a:r>
-            <a:r>
-              <a:rPr lang="en-US" dirty="0" smtClean="0"/>
-              <a:t> Unicorn Dust </a:t>
-            </a:r>
-          </a:p>
-          <a:p>
-            <a:r>
-              <a:rPr lang="en-US" dirty="0" smtClean="0"/>
-              <a:t>Bound Forms</a:t>
-            </a:r>
-          </a:p>
-          <a:p>
-            <a:r>
-              <a:rPr lang="en-US" dirty="0" smtClean="0"/>
-              <a:t>Conclusion, Q&amp;A</a:t>
-            </a:r>
-          </a:p>
-          <a:p>
-            <a:endParaRPr lang="en-US" dirty="0"/>
-          </a:p>
-        </p:txBody>
-      </p:sp>
-    </p:spTree>
-    <p:extLst>
-      <p:ext uri="{BB962C8B-B14F-4D97-AF65-F5344CB8AC3E}">
-        <p14:creationId xmlns:p14="http://schemas.microsoft.com/office/powerpoint/2010/main" val="3529114326"/>
-      </p:ext>
-    </p:extLst>
-  </p:cSld>
-  <p:clrMapOvr>
-    <a:masterClrMapping/>
-  </p:clrMapOvr>
-  <mc:AlternateContent xmlns:mc="http://schemas.openxmlformats.org/markup-compatibility/2006" xmlns:p14="http://schemas.microsoft.com/office/powerpoint/2010/main">
-    <mc:Choice Requires="p14">
-      <p:transition spd="med" p14:dur="700">
-        <p:fade/>
-      </p:transition>
-    </mc:Choice>
-    <mc:Fallback xmlns="">
-      <p:transition spd="med">
-        <p:fade/>
-      </p:transition>
-    </mc:Fallback>
-  </mc:AlternateContent>
-  <p:timing>
-    <p:tnLst>
-      <p:par>
-        <p:cTn id="1" dur="indefinite" restart="never" nodeType="tmRoot"/>
-      </p:par>
-    </p:tnLst>
-  </p:timing>
-</p:sld>
-</file>
-
-<file path=ppt/slides/slide20.xml><?xml version="1.0" encoding="utf-8"?>
+<file path=ppt/slides/slide21.xml><?xml version="1.0" encoding="utf-8"?>
 <p:sld xmlns:a="http://schemas.openxmlformats.org/drawingml/2006/main" xmlns:r="http://schemas.openxmlformats.org/officeDocument/2006/relationships" xmlns:p="http://schemas.openxmlformats.org/presentationml/2006/main">
   <p:cSld>
     <p:spTree>
@@ -11621,7 +11977,7 @@
         <p:spPr>
           <a:xfrm>
             <a:off x="1218882" y="4241800"/>
-            <a:ext cx="4799330" cy="1930400"/>
+            <a:ext cx="7542530" cy="1930400"/>
           </a:xfrm>
         </p:spPr>
         <p:txBody>
@@ -11649,24 +12005,35 @@
               <a:rPr lang="en-US" dirty="0" smtClean="0">
                 <a:hlinkClick r:id="rId2"/>
               </a:rPr>
-              <a:t>http</a:t>
-            </a:r>
-            <a:r>
-              <a:rPr lang="en-US" smtClean="0">
-                <a:hlinkClick r:id="rId2"/>
-              </a:rPr>
-              <a:t>://</a:t>
-            </a:r>
-            <a:r>
-              <a:rPr lang="en-US" smtClean="0">
+              <a:t>http://</a:t>
+            </a:r>
+            <a:r>
+              <a:rPr lang="en-US" dirty="0" smtClean="0">
                 <a:hlinkClick r:id="rId2"/>
               </a:rPr>
               <a:t>bit.ly/coderblog</a:t>
             </a:r>
-            <a:r>
-              <a:rPr lang="en-US" smtClean="0"/>
+            <a:endParaRPr lang="en-US" dirty="0" smtClean="0"/>
+          </a:p>
+          <a:p>
+            <a:r>
+              <a:rPr lang="en-US" dirty="0" smtClean="0">
+                <a:hlinkClick r:id="rId3"/>
+              </a:rPr>
+              <a:t>http</a:t>
+            </a:r>
+            <a:r>
+              <a:rPr lang="en-US" dirty="0">
+                <a:hlinkClick r:id="rId3"/>
+              </a:rPr>
+              <a:t>://github.com/jeremylikness/telerikNEXT2015/</a:t>
+            </a:r>
+            <a:r>
+              <a:rPr lang="en-US" dirty="0"/>
               <a:t> </a:t>
             </a:r>
+          </a:p>
+          <a:p>
             <a:endParaRPr lang="en-US" dirty="0"/>
           </a:p>
         </p:txBody>
@@ -11680,7 +12047,7 @@
           <p:nvPr/>
         </p:nvPicPr>
         <p:blipFill>
-          <a:blip r:embed="rId3">
+          <a:blip r:embed="rId4">
             <a:extLst>
               <a:ext uri="{28A0092B-C50C-407E-A947-70E740481C1C}">
                 <a14:useLocalDpi xmlns:a14="http://schemas.microsoft.com/office/drawing/2010/main" val="0"/>
@@ -11721,7 +12088,7 @@
           <p:nvPr/>
         </p:nvPicPr>
         <p:blipFill>
-          <a:blip r:embed="rId4" cstate="print">
+          <a:blip r:embed="rId5" cstate="print">
             <a:extLst>
               <a:ext uri="{28A0092B-C50C-407E-A947-70E740481C1C}">
                 <a14:useLocalDpi xmlns:a14="http://schemas.microsoft.com/office/drawing/2010/main" val="0"/>
@@ -11742,6 +12109,69 @@
           </a:prstGeom>
         </p:spPr>
       </p:pic>
+      <p:sp>
+        <p:nvSpPr>
+          <p:cNvPr id="8" name="Rounded Rectangle 7"/>
+          <p:cNvSpPr/>
+          <p:nvPr/>
+        </p:nvSpPr>
+        <p:spPr>
+          <a:xfrm>
+            <a:off x="3884612" y="1414462"/>
+            <a:ext cx="4876800" cy="1295400"/>
+          </a:xfrm>
+          <a:prstGeom prst="roundRect">
+            <a:avLst/>
+          </a:prstGeom>
+        </p:spPr>
+        <p:style>
+          <a:lnRef idx="2">
+            <a:schemeClr val="accent4">
+              <a:shade val="50000"/>
+            </a:schemeClr>
+          </a:lnRef>
+          <a:fillRef idx="1">
+            <a:schemeClr val="accent4"/>
+          </a:fillRef>
+          <a:effectRef idx="0">
+            <a:schemeClr val="accent4"/>
+          </a:effectRef>
+          <a:fontRef idx="minor">
+            <a:schemeClr val="lt1"/>
+          </a:fontRef>
+        </p:style>
+        <p:txBody>
+          <a:bodyPr rtlCol="0" anchor="ctr"/>
+          <a:lstStyle/>
+          <a:p>
+            <a:pPr algn="ctr"/>
+            <a:r>
+              <a:rPr lang="en-US" sz="2800" dirty="0" smtClean="0"/>
+              <a:t>How’s My Driving?</a:t>
+            </a:r>
+          </a:p>
+          <a:p>
+            <a:pPr algn="ctr"/>
+            <a:r>
+              <a:rPr lang="en-US" sz="2800" dirty="0">
+                <a:hlinkClick r:id="rId6"/>
+              </a:rPr>
+              <a:t>http://</a:t>
+            </a:r>
+            <a:r>
+              <a:rPr lang="en-US" sz="2800" dirty="0" smtClean="0">
+                <a:hlinkClick r:id="rId6"/>
+              </a:rPr>
+              <a:t>bit.ly/next-likness-1</a:t>
+            </a:r>
+            <a:r>
+              <a:rPr lang="en-US" sz="2800" dirty="0" smtClean="0"/>
+              <a:t>  </a:t>
+            </a:r>
+            <a:endParaRPr lang="en-US" sz="2800" dirty="0"/>
+          </a:p>
+        </p:txBody>
+      </p:sp>
     </p:spTree>
     <p:extLst>
       <p:ext uri="{BB962C8B-B14F-4D97-AF65-F5344CB8AC3E}">
@@ -11882,7 +12312,6 @@
               <a:rPr lang="en-US" dirty="0" smtClean="0"/>
               <a:t>REST easy </a:t>
             </a:r>
-            <a:endParaRPr lang="en-US" dirty="0" smtClean="0"/>
           </a:p>
           <a:p>
             <a:pPr lvl="1"/>
@@ -11890,7 +12319,6 @@
               <a:rPr lang="en-US" dirty="0" smtClean="0"/>
               <a:t>Oh, Data?</a:t>
             </a:r>
-            <a:endParaRPr lang="en-US" dirty="0" smtClean="0"/>
           </a:p>
           <a:p>
             <a:pPr lvl="1"/>
@@ -12707,6 +13135,85 @@
           <a:chExt cx="0" cy="0"/>
         </a:xfrm>
       </p:grpSpPr>
+      <p:pic>
+        <p:nvPicPr>
+          <p:cNvPr id="5" name="Picture 4"/>
+          <p:cNvPicPr>
+            <a:picLocks noChangeAspect="1"/>
+          </p:cNvPicPr>
+          <p:nvPr/>
+        </p:nvPicPr>
+        <p:blipFill>
+          <a:blip r:embed="rId2"/>
+          <a:stretch>
+            <a:fillRect/>
+          </a:stretch>
+        </p:blipFill>
+        <p:spPr>
+          <a:xfrm>
+            <a:off x="3579811" y="259735"/>
+            <a:ext cx="4857197" cy="6293465"/>
+          </a:xfrm>
+          <a:prstGeom prst="rect">
+            <a:avLst/>
+          </a:prstGeom>
+          <a:scene3d>
+            <a:camera prst="orthographicFront">
+              <a:rot lat="0" lon="0" rev="0"/>
+            </a:camera>
+            <a:lightRig rig="threePt" dir="t"/>
+          </a:scene3d>
+        </p:spPr>
+      </p:pic>
+    </p:spTree>
+    <p:extLst>
+      <p:ext uri="{BB962C8B-B14F-4D97-AF65-F5344CB8AC3E}">
+        <p14:creationId xmlns:p14="http://schemas.microsoft.com/office/powerpoint/2010/main" val="48007362"/>
+      </p:ext>
+    </p:extLst>
+  </p:cSld>
+  <p:clrMapOvr>
+    <a:masterClrMapping/>
+  </p:clrMapOvr>
+  <mc:AlternateContent xmlns:mc="http://schemas.openxmlformats.org/markup-compatibility/2006">
+    <mc:Choice xmlns:p14="http://schemas.microsoft.com/office/powerpoint/2010/main" Requires="p14">
+      <p:transition spd="med" p14:dur="700">
+        <p:fade/>
+      </p:transition>
+    </mc:Choice>
+    <mc:Fallback>
+      <p:transition spd="med">
+        <p:fade/>
+      </p:transition>
+    </mc:Fallback>
+  </mc:AlternateContent>
+  <p:timing>
+    <p:tnLst>
+      <p:par>
+        <p:cTn id="1" dur="indefinite" restart="never" nodeType="tmRoot"/>
+      </p:par>
+    </p:tnLst>
+  </p:timing>
+</p:sld>
+</file>
+
+<file path=ppt/slides/slide7.xml><?xml version="1.0" encoding="utf-8"?>
+<p:sld xmlns:a="http://schemas.openxmlformats.org/drawingml/2006/main" xmlns:r="http://schemas.openxmlformats.org/officeDocument/2006/relationships" xmlns:p="http://schemas.openxmlformats.org/presentationml/2006/main">
+  <p:cSld>
+    <p:spTree>
+      <p:nvGrpSpPr>
+        <p:cNvPr id="1" name=""/>
+        <p:cNvGrpSpPr/>
+        <p:nvPr/>
+      </p:nvGrpSpPr>
+      <p:grpSpPr>
+        <a:xfrm>
+          <a:off x="0" y="0"/>
+          <a:ext cx="0" cy="0"/>
+          <a:chOff x="0" y="0"/>
+          <a:chExt cx="0" cy="0"/>
+        </a:xfrm>
+      </p:grpSpPr>
       <p:sp>
         <p:nvSpPr>
           <p:cNvPr id="4" name="Title 3"/>
@@ -12785,7 +13292,7 @@
 </p:sld>
 </file>
 
-<file path=ppt/slides/slide7.xml><?xml version="1.0" encoding="utf-8"?>
+<file path=ppt/slides/slide8.xml><?xml version="1.0" encoding="utf-8"?>
 <p:sld xmlns:a="http://schemas.openxmlformats.org/drawingml/2006/main" xmlns:r="http://schemas.openxmlformats.org/officeDocument/2006/relationships" xmlns:p="http://schemas.openxmlformats.org/presentationml/2006/main">
   <p:cSld>
     <p:spTree>
@@ -12850,13 +13357,8 @@
           <a:p>
             <a:r>
               <a:rPr lang="en-US" dirty="0" smtClean="0"/>
-              <a:t>… </a:t>
-            </a:r>
-            <a:r>
-              <a:rPr lang="en-US" dirty="0" smtClean="0"/>
-              <a:t>in many cases it “just works” </a:t>
-            </a:r>
-            <a:endParaRPr lang="en-US" dirty="0" smtClean="0"/>
+              <a:t>… in many cases it “just works” </a:t>
+            </a:r>
           </a:p>
           <a:p>
             <a:r>
@@ -13123,7 +13625,7 @@
 </p:sld>
 </file>
 
-<file path=ppt/slides/slide8.xml><?xml version="1.0" encoding="utf-8"?>
+<file path=ppt/slides/slide9.xml><?xml version="1.0" encoding="utf-8"?>
 <p:sld xmlns:a="http://schemas.openxmlformats.org/drawingml/2006/main" xmlns:r="http://schemas.openxmlformats.org/officeDocument/2006/relationships" xmlns:p="http://schemas.openxmlformats.org/presentationml/2006/main">
   <p:cSld>
     <p:spTree>
@@ -13209,13 +13711,8 @@
           <a:p>
             <a:r>
               <a:rPr lang="en-US" dirty="0" smtClean="0"/>
-              <a:t>Built-in support for multiple databases (SQL, SQL Azure, Oracle, MySQL, SQLite, PostgreSQL &amp; </a:t>
-            </a:r>
-            <a:r>
-              <a:rPr lang="en-US" dirty="0" smtClean="0"/>
-              <a:t>more)</a:t>
-            </a:r>
-            <a:endParaRPr lang="en-US" dirty="0" smtClean="0"/>
+              <a:t>Built-in support for multiple databases (SQL, SQL Azure, Oracle, MySQL, SQLite, PostgreSQL &amp; more)</a:t>
+            </a:r>
           </a:p>
           <a:p>
             <a:r>
@@ -13529,367 +14026,6 @@
                                           <p:spTgt spid="14">
                                             <p:txEl>
                                               <p:pRg st="5" end="5"/>
-                                            </p:txEl>
-                                          </p:spTgt>
-                                        </p:tgtEl>
-                                        <p:attrNameLst>
-                                          <p:attrName>style.visibility</p:attrName>
-                                        </p:attrNameLst>
-                                      </p:cBhvr>
-                                      <p:to>
-                                        <p:strVal val="visible"/>
-                                      </p:to>
-                                    </p:set>
-                                  </p:childTnLst>
-                                </p:cTn>
-                              </p:par>
-                            </p:childTnLst>
-                          </p:cTn>
-                        </p:par>
-                      </p:childTnLst>
-                    </p:cTn>
-                  </p:par>
-                </p:childTnLst>
-              </p:cTn>
-              <p:prevCondLst>
-                <p:cond evt="onPrev" delay="0">
-                  <p:tgtEl>
-                    <p:sldTgt/>
-                  </p:tgtEl>
-                </p:cond>
-              </p:prevCondLst>
-              <p:nextCondLst>
-                <p:cond evt="onNext" delay="0">
-                  <p:tgtEl>
-                    <p:sldTgt/>
-                  </p:tgtEl>
-                </p:cond>
-              </p:nextCondLst>
-            </p:seq>
-          </p:childTnLst>
-        </p:cTn>
-      </p:par>
-    </p:tnLst>
-  </p:timing>
-</p:sld>
-</file>
-
-<file path=ppt/slides/slide9.xml><?xml version="1.0" encoding="utf-8"?>
-<p:sld xmlns:a="http://schemas.openxmlformats.org/drawingml/2006/main" xmlns:r="http://schemas.openxmlformats.org/officeDocument/2006/relationships" xmlns:p="http://schemas.openxmlformats.org/presentationml/2006/main">
-  <p:cSld>
-    <p:spTree>
-      <p:nvGrpSpPr>
-        <p:cNvPr id="1" name=""/>
-        <p:cNvGrpSpPr/>
-        <p:nvPr/>
-      </p:nvGrpSpPr>
-      <p:grpSpPr>
-        <a:xfrm>
-          <a:off x="0" y="0"/>
-          <a:ext cx="0" cy="0"/>
-          <a:chOff x="0" y="0"/>
-          <a:chExt cx="0" cy="0"/>
-        </a:xfrm>
-      </p:grpSpPr>
-      <p:sp>
-        <p:nvSpPr>
-          <p:cNvPr id="2" name="Title 1"/>
-          <p:cNvSpPr>
-            <a:spLocks noGrp="1"/>
-          </p:cNvSpPr>
-          <p:nvPr>
-            <p:ph type="title"/>
-          </p:nvPr>
-        </p:nvSpPr>
-        <p:spPr/>
-        <p:txBody>
-          <a:bodyPr/>
-          <a:lstStyle/>
-          <a:p>
-            <a:r>
-              <a:rPr lang="en-US" dirty="0" smtClean="0"/>
-              <a:t>Web API and REST</a:t>
-            </a:r>
-            <a:endParaRPr lang="en-US" dirty="0"/>
-          </a:p>
-        </p:txBody>
-      </p:sp>
-      <p:sp>
-        <p:nvSpPr>
-          <p:cNvPr id="3" name="Content Placeholder 2"/>
-          <p:cNvSpPr>
-            <a:spLocks noGrp="1"/>
-          </p:cNvSpPr>
-          <p:nvPr>
-            <p:ph sz="half" idx="1"/>
-          </p:nvPr>
-        </p:nvSpPr>
-        <p:spPr/>
-        <p:txBody>
-          <a:bodyPr/>
-          <a:lstStyle/>
-          <a:p>
-            <a:r>
-              <a:rPr lang="en-US" dirty="0" smtClean="0"/>
-              <a:t>Entity Framework gives you easy access to your data</a:t>
-            </a:r>
-          </a:p>
-          <a:p>
-            <a:r>
-              <a:rPr lang="en-US" dirty="0" smtClean="0"/>
-              <a:t>Repository pattern is nice (we’ll skip it today)</a:t>
-            </a:r>
-          </a:p>
-          <a:p>
-            <a:r>
-              <a:rPr lang="en-US" dirty="0" smtClean="0"/>
-              <a:t>Web API is all about taking your data and exposing it via REST</a:t>
-            </a:r>
-          </a:p>
-          <a:p>
-            <a:r>
-              <a:rPr lang="en-US" dirty="0" smtClean="0"/>
-              <a:t>OData is another option on top of Web API</a:t>
-            </a:r>
-            <a:endParaRPr lang="en-US" dirty="0"/>
-          </a:p>
-        </p:txBody>
-      </p:sp>
-      <p:pic>
-        <p:nvPicPr>
-          <p:cNvPr id="5" name="Content Placeholder 4"/>
-          <p:cNvPicPr>
-            <a:picLocks noGrp="1" noChangeAspect="1"/>
-          </p:cNvPicPr>
-          <p:nvPr>
-            <p:ph sz="half" idx="2"/>
-          </p:nvPr>
-        </p:nvPicPr>
-        <p:blipFill>
-          <a:blip r:embed="rId2" cstate="print">
-            <a:extLst>
-              <a:ext uri="{28A0092B-C50C-407E-A947-70E740481C1C}">
-                <a14:useLocalDpi xmlns:a14="http://schemas.microsoft.com/office/drawing/2010/main" val="0"/>
-              </a:ext>
-            </a:extLst>
-          </a:blip>
-          <a:stretch>
-            <a:fillRect/>
-          </a:stretch>
-        </p:blipFill>
-        <p:spPr>
-          <a:xfrm>
-            <a:off x="6500813" y="2246577"/>
-            <a:ext cx="5078412" cy="3385608"/>
-          </a:xfrm>
-        </p:spPr>
-      </p:pic>
-    </p:spTree>
-    <p:extLst>
-      <p:ext uri="{BB962C8B-B14F-4D97-AF65-F5344CB8AC3E}">
-        <p14:creationId xmlns:p14="http://schemas.microsoft.com/office/powerpoint/2010/main" val="1081518152"/>
-      </p:ext>
-    </p:extLst>
-  </p:cSld>
-  <p:clrMapOvr>
-    <a:masterClrMapping/>
-  </p:clrMapOvr>
-  <mc:AlternateContent xmlns:mc="http://schemas.openxmlformats.org/markup-compatibility/2006" xmlns:p14="http://schemas.microsoft.com/office/powerpoint/2010/main">
-    <mc:Choice Requires="p14">
-      <p:transition spd="med" p14:dur="700">
-        <p:fade/>
-      </p:transition>
-    </mc:Choice>
-    <mc:Fallback xmlns="">
-      <p:transition spd="med">
-        <p:fade/>
-      </p:transition>
-    </mc:Fallback>
-  </mc:AlternateContent>
-  <p:timing>
-    <p:tnLst>
-      <p:par>
-        <p:cTn id="1" dur="indefinite" restart="never" nodeType="tmRoot">
-          <p:childTnLst>
-            <p:seq concurrent="1" nextAc="seek">
-              <p:cTn id="2" dur="indefinite" nodeType="mainSeq">
-                <p:childTnLst>
-                  <p:par>
-                    <p:cTn id="3" fill="hold">
-                      <p:stCondLst>
-                        <p:cond delay="indefinite"/>
-                      </p:stCondLst>
-                      <p:childTnLst>
-                        <p:par>
-                          <p:cTn id="4" fill="hold">
-                            <p:stCondLst>
-                              <p:cond delay="0"/>
-                            </p:stCondLst>
-                            <p:childTnLst>
-                              <p:par>
-                                <p:cTn id="5" presetID="1" presetClass="entr" presetSubtype="0" fill="hold" nodeType="clickEffect">
-                                  <p:stCondLst>
-                                    <p:cond delay="0"/>
-                                  </p:stCondLst>
-                                  <p:childTnLst>
-                                    <p:set>
-                                      <p:cBhvr>
-                                        <p:cTn id="6" dur="1" fill="hold">
-                                          <p:stCondLst>
-                                            <p:cond delay="0"/>
-                                          </p:stCondLst>
-                                        </p:cTn>
-                                        <p:tgtEl>
-                                          <p:spTgt spid="3">
-                                            <p:txEl>
-                                              <p:pRg st="0" end="0"/>
-                                            </p:txEl>
-                                          </p:spTgt>
-                                        </p:tgtEl>
-                                        <p:attrNameLst>
-                                          <p:attrName>style.visibility</p:attrName>
-                                        </p:attrNameLst>
-                                      </p:cBhvr>
-                                      <p:to>
-                                        <p:strVal val="visible"/>
-                                      </p:to>
-                                    </p:set>
-                                  </p:childTnLst>
-                                </p:cTn>
-                              </p:par>
-                            </p:childTnLst>
-                          </p:cTn>
-                        </p:par>
-                      </p:childTnLst>
-                    </p:cTn>
-                  </p:par>
-                  <p:par>
-                    <p:cTn id="7" fill="hold">
-                      <p:stCondLst>
-                        <p:cond delay="indefinite"/>
-                      </p:stCondLst>
-                      <p:childTnLst>
-                        <p:par>
-                          <p:cTn id="8" fill="hold">
-                            <p:stCondLst>
-                              <p:cond delay="0"/>
-                            </p:stCondLst>
-                            <p:childTnLst>
-                              <p:par>
-                                <p:cTn id="9" presetID="1" presetClass="entr" presetSubtype="0" fill="hold" nodeType="clickEffect">
-                                  <p:stCondLst>
-                                    <p:cond delay="0"/>
-                                  </p:stCondLst>
-                                  <p:childTnLst>
-                                    <p:set>
-                                      <p:cBhvr>
-                                        <p:cTn id="10" dur="1" fill="hold">
-                                          <p:stCondLst>
-                                            <p:cond delay="0"/>
-                                          </p:stCondLst>
-                                        </p:cTn>
-                                        <p:tgtEl>
-                                          <p:spTgt spid="3">
-                                            <p:txEl>
-                                              <p:pRg st="1" end="1"/>
-                                            </p:txEl>
-                                          </p:spTgt>
-                                        </p:tgtEl>
-                                        <p:attrNameLst>
-                                          <p:attrName>style.visibility</p:attrName>
-                                        </p:attrNameLst>
-                                      </p:cBhvr>
-                                      <p:to>
-                                        <p:strVal val="visible"/>
-                                      </p:to>
-                                    </p:set>
-                                  </p:childTnLst>
-                                </p:cTn>
-                              </p:par>
-                            </p:childTnLst>
-                          </p:cTn>
-                        </p:par>
-                      </p:childTnLst>
-                    </p:cTn>
-                  </p:par>
-                  <p:par>
-                    <p:cTn id="11" fill="hold">
-                      <p:stCondLst>
-                        <p:cond delay="indefinite"/>
-                      </p:stCondLst>
-                      <p:childTnLst>
-                        <p:par>
-                          <p:cTn id="12" fill="hold">
-                            <p:stCondLst>
-                              <p:cond delay="0"/>
-                            </p:stCondLst>
-                            <p:childTnLst>
-                              <p:par>
-                                <p:cTn id="13" presetID="1" presetClass="entr" presetSubtype="0" fill="hold" nodeType="clickEffect">
-                                  <p:stCondLst>
-                                    <p:cond delay="0"/>
-                                  </p:stCondLst>
-                                  <p:childTnLst>
-                                    <p:set>
-                                      <p:cBhvr>
-                                        <p:cTn id="14" dur="1" fill="hold">
-                                          <p:stCondLst>
-                                            <p:cond delay="0"/>
-                                          </p:stCondLst>
-                                        </p:cTn>
-                                        <p:tgtEl>
-                                          <p:spTgt spid="3">
-                                            <p:txEl>
-                                              <p:pRg st="2" end="2"/>
-                                            </p:txEl>
-                                          </p:spTgt>
-                                        </p:tgtEl>
-                                        <p:attrNameLst>
-                                          <p:attrName>style.visibility</p:attrName>
-                                        </p:attrNameLst>
-                                      </p:cBhvr>
-                                      <p:to>
-                                        <p:strVal val="visible"/>
-                                      </p:to>
-                                    </p:set>
-                                  </p:childTnLst>
-                                </p:cTn>
-                              </p:par>
-                            </p:childTnLst>
-                          </p:cTn>
-                        </p:par>
-                      </p:childTnLst>
-                    </p:cTn>
-                  </p:par>
-                  <p:par>
-                    <p:cTn id="15" fill="hold">
-                      <p:stCondLst>
-                        <p:cond delay="indefinite"/>
-                      </p:stCondLst>
-                      <p:childTnLst>
-                        <p:par>
-                          <p:cTn id="16" fill="hold">
-                            <p:stCondLst>
-                              <p:cond delay="0"/>
-                            </p:stCondLst>
-                            <p:childTnLst>
-                              <p:par>
-                                <p:cTn id="17" presetID="1" presetClass="entr" presetSubtype="0" fill="hold" nodeType="clickEffect">
-                                  <p:stCondLst>
-                                    <p:cond delay="0"/>
-                                  </p:stCondLst>
-                                  <p:childTnLst>
-                                    <p:set>
-                                      <p:cBhvr>
-                                        <p:cTn id="18" dur="1" fill="hold">
-                                          <p:stCondLst>
-                                            <p:cond delay="0"/>
-                                          </p:stCondLst>
-                                        </p:cTn>
-                                        <p:tgtEl>
-                                          <p:spTgt spid="3">
-                                            <p:txEl>
-                                              <p:pRg st="3" end="3"/>
                                             </p:txEl>
                                           </p:spTgt>
                                         </p:tgtEl>

</xml_diff>